<commit_message>
Add Reference to Submodule_2_Lecture_2
</commit_message>
<xml_diff>
--- a/Submodule_2/Lectures/Submodule_2_Lecture_2_FAIR_Data_Principles_and_FAIRness_Metrics.pptx
+++ b/Submodule_2/Lectures/Submodule_2_Lecture_2_FAIR_Data_Principles_and_FAIRness_Metrics.pptx
@@ -15644,14 +15644,14 @@
               <a:buChar char="●"/>
             </a:pPr>
             <a:r>
-              <a:rPr lang="en" sz="1800">
+              <a:rPr lang="en" sz="1800" dirty="0">
                 <a:solidFill>
                   <a:schemeClr val="dk2"/>
                 </a:solidFill>
               </a:rPr>
               <a:t>The FAIR principles are aspirational</a:t>
             </a:r>
-            <a:endParaRPr sz="1800">
+            <a:endParaRPr sz="1800" dirty="0">
               <a:solidFill>
                 <a:schemeClr val="dk2"/>
               </a:solidFill>
@@ -15675,14 +15675,30 @@
               <a:buChar char="○"/>
             </a:pPr>
             <a:r>
-              <a:rPr lang="en" sz="1600">
+              <a:rPr lang="en" sz="1600" dirty="0">
                 <a:solidFill>
                   <a:schemeClr val="dk2"/>
                 </a:solidFill>
               </a:rPr>
-              <a:t>They do not strictly define how to achieve a state of “FAIRness”.</a:t>
+              <a:t>They do not strictly define how to achieve a state of “</a:t>
             </a:r>
-            <a:endParaRPr sz="1600">
+            <a:r>
+              <a:rPr lang="en" sz="1600" dirty="0" err="1">
+                <a:solidFill>
+                  <a:schemeClr val="dk2"/>
+                </a:solidFill>
+              </a:rPr>
+              <a:t>FAIRness</a:t>
+            </a:r>
+            <a:r>
+              <a:rPr lang="en" sz="1600" dirty="0">
+                <a:solidFill>
+                  <a:schemeClr val="dk2"/>
+                </a:solidFill>
+              </a:rPr>
+              <a:t>”.</a:t>
+            </a:r>
+            <a:endParaRPr sz="1600" dirty="0">
               <a:solidFill>
                 <a:schemeClr val="dk2"/>
               </a:solidFill>
@@ -15706,14 +15722,14 @@
               <a:buChar char="○"/>
             </a:pPr>
             <a:r>
-              <a:rPr lang="en" sz="1600">
+              <a:rPr lang="en" sz="1600" dirty="0">
                 <a:solidFill>
                   <a:schemeClr val="dk2"/>
                 </a:solidFill>
               </a:rPr>
               <a:t>They describe a continuum of features, attributes, and behaviors that will move a digital resource closer to that goal.</a:t>
             </a:r>
-            <a:endParaRPr sz="1600">
+            <a:endParaRPr sz="1600" dirty="0">
               <a:solidFill>
                 <a:schemeClr val="dk2"/>
               </a:solidFill>
@@ -15737,15 +15753,23 @@
               <a:buChar char="●"/>
             </a:pPr>
             <a:r>
-              <a:rPr lang="en" sz="1800">
+              <a:rPr lang="en" sz="1800" dirty="0" err="1">
                 <a:solidFill>
                   <a:schemeClr val="dk2"/>
                 </a:solidFill>
               </a:rPr>
-              <a:t>FAIRness metrics (</a:t>
+              <a:t>FAIRness</a:t>
             </a:r>
             <a:r>
-              <a:rPr lang="en" sz="1800" u="sng">
+              <a:rPr lang="en" sz="1800" dirty="0">
+                <a:solidFill>
+                  <a:schemeClr val="dk2"/>
+                </a:solidFill>
+              </a:rPr>
+              <a:t> metrics (</a:t>
+            </a:r>
+            <a:r>
+              <a:rPr lang="en" sz="1800" u="sng" dirty="0">
                 <a:solidFill>
                   <a:schemeClr val="hlink"/>
                 </a:solidFill>
@@ -15754,14 +15778,14 @@
               <a:t>https://github.com/FAIRMetrics/Metrics</a:t>
             </a:r>
             <a:r>
-              <a:rPr lang="en" sz="1800">
+              <a:rPr lang="en" sz="1800" dirty="0">
                 <a:solidFill>
                   <a:schemeClr val="dk2"/>
                 </a:solidFill>
               </a:rPr>
               <a:t>)</a:t>
             </a:r>
-            <a:endParaRPr sz="1800">
+            <a:endParaRPr sz="1800" dirty="0">
               <a:solidFill>
                 <a:schemeClr val="dk2"/>
               </a:solidFill>
@@ -15785,14 +15809,30 @@
               <a:buChar char="○"/>
             </a:pPr>
             <a:r>
-              <a:rPr lang="en" sz="1800">
+              <a:rPr lang="en" sz="1800" dirty="0">
                 <a:solidFill>
                   <a:schemeClr val="dk2"/>
                 </a:solidFill>
               </a:rPr>
-              <a:t>Provides the qualitative and quantitative ways to measure the FAIRness of a digital resource.</a:t>
+              <a:t>Provides the qualitative and quantitative ways to measure the </a:t>
             </a:r>
-            <a:endParaRPr sz="1800">
+            <a:r>
+              <a:rPr lang="en" sz="1800" dirty="0" err="1">
+                <a:solidFill>
+                  <a:schemeClr val="dk2"/>
+                </a:solidFill>
+              </a:rPr>
+              <a:t>FAIRness</a:t>
+            </a:r>
+            <a:r>
+              <a:rPr lang="en" sz="1800" dirty="0">
+                <a:solidFill>
+                  <a:schemeClr val="dk2"/>
+                </a:solidFill>
+              </a:rPr>
+              <a:t> of a digital resource.</a:t>
+            </a:r>
+            <a:endParaRPr sz="1800" dirty="0">
               <a:solidFill>
                 <a:schemeClr val="dk2"/>
               </a:solidFill>
@@ -15811,7 +15851,7 @@
               </a:spcAft>
               <a:buNone/>
             </a:pPr>
-            <a:endParaRPr sz="1800">
+            <a:endParaRPr sz="1800" dirty="0">
               <a:solidFill>
                 <a:schemeClr val="dk2"/>
               </a:solidFill>
@@ -15831,14 +15871,30 @@
               <a:buNone/>
             </a:pPr>
             <a:r>
-              <a:rPr lang="en" sz="1800">
+              <a:rPr lang="en" sz="1800" dirty="0">
                 <a:solidFill>
                   <a:schemeClr val="dk2"/>
                 </a:solidFill>
               </a:rPr>
-              <a:t>(https://www.nature.com/articles/sdata2018118)</a:t>
+              <a:t>(https://</a:t>
             </a:r>
-            <a:endParaRPr sz="1800">
+            <a:r>
+              <a:rPr lang="en" sz="1800" dirty="0" err="1">
+                <a:solidFill>
+                  <a:schemeClr val="dk2"/>
+                </a:solidFill>
+              </a:rPr>
+              <a:t>www.nature.com</a:t>
+            </a:r>
+            <a:r>
+              <a:rPr lang="en" sz="1800" dirty="0">
+                <a:solidFill>
+                  <a:schemeClr val="dk2"/>
+                </a:solidFill>
+              </a:rPr>
+              <a:t>/articles/sdata2018118)</a:t>
+            </a:r>
+            <a:endParaRPr sz="1800" dirty="0">
               <a:solidFill>
                 <a:schemeClr val="dk2"/>
               </a:solidFill>
@@ -15857,7 +15913,7 @@
               </a:spcAft>
               <a:buNone/>
             </a:pPr>
-            <a:endParaRPr sz="1800">
+            <a:endParaRPr sz="1800" dirty="0">
               <a:solidFill>
                 <a:schemeClr val="dk2"/>
               </a:solidFill>
@@ -15873,7 +15929,7 @@
               </a:spcAft>
               <a:buNone/>
             </a:pPr>
-            <a:endParaRPr sz="1800">
+            <a:endParaRPr sz="1800" dirty="0">
               <a:solidFill>
                 <a:schemeClr val="dk2"/>
               </a:solidFill>
@@ -16555,7 +16611,7 @@
               <a:buChar char="●"/>
             </a:pPr>
             <a:r>
-              <a:rPr lang="en" sz="1800" b="1">
+              <a:rPr lang="en" sz="1800" b="1" dirty="0">
                 <a:solidFill>
                   <a:schemeClr val="dk2"/>
                 </a:solidFill>
@@ -16563,14 +16619,14 @@
               <a:t>Clear: </a:t>
             </a:r>
             <a:r>
-              <a:rPr lang="en" sz="1800">
+              <a:rPr lang="en" sz="1800" dirty="0">
                 <a:solidFill>
                   <a:schemeClr val="dk2"/>
                 </a:solidFill>
               </a:rPr>
               <a:t>anyone can understand the purpose of the metric.</a:t>
             </a:r>
-            <a:endParaRPr sz="1800">
+            <a:endParaRPr sz="1800" dirty="0">
               <a:solidFill>
                 <a:schemeClr val="dk2"/>
               </a:solidFill>
@@ -16594,7 +16650,7 @@
               <a:buChar char="●"/>
             </a:pPr>
             <a:r>
-              <a:rPr lang="en" sz="1800" b="1">
+              <a:rPr lang="en" sz="1800" b="1" dirty="0">
                 <a:solidFill>
                   <a:schemeClr val="dk2"/>
                 </a:solidFill>
@@ -16602,14 +16658,14 @@
               <a:t>Realistic: </a:t>
             </a:r>
             <a:r>
-              <a:rPr lang="en" sz="1800">
+              <a:rPr lang="en" sz="1800" dirty="0">
                 <a:solidFill>
                   <a:schemeClr val="dk2"/>
                 </a:solidFill>
               </a:rPr>
               <a:t>it should be simple enough for a resource to comply.</a:t>
             </a:r>
-            <a:endParaRPr sz="1800">
+            <a:endParaRPr sz="1800" dirty="0">
               <a:solidFill>
                 <a:schemeClr val="dk2"/>
               </a:solidFill>
@@ -16633,7 +16689,7 @@
               <a:buChar char="●"/>
             </a:pPr>
             <a:r>
-              <a:rPr lang="en" sz="1800" b="1">
+              <a:rPr lang="en" sz="1800" b="1" dirty="0">
                 <a:solidFill>
                   <a:schemeClr val="dk2"/>
                 </a:solidFill>
@@ -16641,14 +16697,30 @@
               <a:t>Discriminating:</a:t>
             </a:r>
             <a:r>
-              <a:rPr lang="en" sz="1800">
+              <a:rPr lang="en" sz="1800" dirty="0">
                 <a:solidFill>
                   <a:schemeClr val="dk2"/>
                 </a:solidFill>
               </a:rPr>
-              <a:t> it should measure something important for FAIRness, distinguish the degree to which that resource meets that objective, and be able to provide instruction as to what would maximize that value.</a:t>
+              <a:t> it should measure something important for </a:t>
             </a:r>
-            <a:endParaRPr sz="1800">
+            <a:r>
+              <a:rPr lang="en" sz="1800" dirty="0" err="1">
+                <a:solidFill>
+                  <a:schemeClr val="dk2"/>
+                </a:solidFill>
+              </a:rPr>
+              <a:t>FAIRness</a:t>
+            </a:r>
+            <a:r>
+              <a:rPr lang="en" sz="1800" dirty="0">
+                <a:solidFill>
+                  <a:schemeClr val="dk2"/>
+                </a:solidFill>
+              </a:rPr>
+              <a:t>, distinguish the degree to which that resource meets that objective, and be able to provide instruction as to what would maximize that value.</a:t>
+            </a:r>
+            <a:endParaRPr sz="1800" dirty="0">
               <a:solidFill>
                 <a:schemeClr val="dk2"/>
               </a:solidFill>
@@ -16672,7 +16744,7 @@
               <a:buChar char="●"/>
             </a:pPr>
             <a:r>
-              <a:rPr lang="en" sz="1800" b="1">
+              <a:rPr lang="en" sz="1800" b="1" dirty="0">
                 <a:solidFill>
                   <a:schemeClr val="dk2"/>
                 </a:solidFill>
@@ -16680,14 +16752,14 @@
               <a:t>Measurable:</a:t>
             </a:r>
             <a:r>
-              <a:rPr lang="en" sz="1800">
+              <a:rPr lang="en" sz="1800" dirty="0">
                 <a:solidFill>
                   <a:schemeClr val="dk2"/>
                 </a:solidFill>
               </a:rPr>
               <a:t> the assessment can be made in an objective, quantitative, machine-interpretable, scalable, and reproducible manner.</a:t>
             </a:r>
-            <a:endParaRPr sz="1800">
+            <a:endParaRPr sz="1800" dirty="0">
               <a:solidFill>
                 <a:schemeClr val="dk2"/>
               </a:solidFill>
@@ -16711,7 +16783,7 @@
               <a:buChar char="●"/>
             </a:pPr>
             <a:r>
-              <a:rPr lang="en" sz="1800" b="1">
+              <a:rPr lang="en" sz="1800" b="1" dirty="0">
                 <a:solidFill>
                   <a:schemeClr val="dk2"/>
                 </a:solidFill>
@@ -16719,14 +16791,14 @@
               <a:t>Universal:</a:t>
             </a:r>
             <a:r>
-              <a:rPr lang="en" sz="1800">
+              <a:rPr lang="en" sz="1800" dirty="0">
                 <a:solidFill>
                   <a:schemeClr val="dk2"/>
                 </a:solidFill>
               </a:rPr>
               <a:t> it should be applicable to all digital resources.</a:t>
             </a:r>
-            <a:endParaRPr sz="1800">
+            <a:endParaRPr sz="1800" dirty="0">
               <a:solidFill>
                 <a:schemeClr val="dk2"/>
               </a:solidFill>
@@ -16746,14 +16818,30 @@
               <a:buNone/>
             </a:pPr>
             <a:r>
-              <a:rPr lang="en" sz="1800">
+              <a:rPr lang="en" sz="1800" dirty="0">
                 <a:solidFill>
                   <a:schemeClr val="dk2"/>
                 </a:solidFill>
               </a:rPr>
-              <a:t>(https://www.nature.com/articles/sdata2018118)</a:t>
+              <a:t>(https://</a:t>
             </a:r>
-            <a:endParaRPr sz="1800">
+            <a:r>
+              <a:rPr lang="en" sz="1800" dirty="0" err="1">
+                <a:solidFill>
+                  <a:schemeClr val="dk2"/>
+                </a:solidFill>
+              </a:rPr>
+              <a:t>www.nature.com</a:t>
+            </a:r>
+            <a:r>
+              <a:rPr lang="en" sz="1800" dirty="0">
+                <a:solidFill>
+                  <a:schemeClr val="dk2"/>
+                </a:solidFill>
+              </a:rPr>
+              <a:t>/articles/sdata2018118)</a:t>
+            </a:r>
+            <a:endParaRPr sz="1800" dirty="0">
               <a:solidFill>
                 <a:schemeClr val="dk2"/>
               </a:solidFill>
@@ -16772,7 +16860,7 @@
               </a:spcAft>
               <a:buNone/>
             </a:pPr>
-            <a:endParaRPr sz="1800">
+            <a:endParaRPr sz="1800" dirty="0">
               <a:solidFill>
                 <a:schemeClr val="dk2"/>
               </a:solidFill>
@@ -16788,7 +16876,7 @@
               </a:spcAft>
               <a:buNone/>
             </a:pPr>
-            <a:endParaRPr sz="1800">
+            <a:endParaRPr sz="1800" dirty="0">
               <a:solidFill>
                 <a:schemeClr val="dk2"/>
               </a:solidFill>
@@ -22824,14 +22912,14 @@
               <a:buChar char="●"/>
             </a:pPr>
             <a:r>
-              <a:rPr lang="en" sz="1800" b="1">
+              <a:rPr lang="en" sz="1800" b="1" dirty="0">
                 <a:solidFill>
                   <a:schemeClr val="dk2"/>
                 </a:solidFill>
               </a:rPr>
               <a:t>Purpose:</a:t>
             </a:r>
-            <a:endParaRPr sz="1800" b="1">
+            <a:endParaRPr sz="1800" b="1" dirty="0">
               <a:solidFill>
                 <a:schemeClr val="dk2"/>
               </a:solidFill>
@@ -22855,14 +22943,30 @@
               <a:buChar char="○"/>
             </a:pPr>
             <a:r>
-              <a:rPr lang="en" sz="1800">
+              <a:rPr lang="en" sz="1800" dirty="0">
                 <a:solidFill>
                   <a:schemeClr val="dk2"/>
                 </a:solidFill>
               </a:rPr>
-              <a:t>Helps evaluate the FAIRness (Findable, Accessible, Interoperable, Reusable) of digital resources.</a:t>
+              <a:t>Helps evaluate the </a:t>
             </a:r>
-            <a:endParaRPr sz="1800">
+            <a:r>
+              <a:rPr lang="en" sz="1800" dirty="0" err="1">
+                <a:solidFill>
+                  <a:schemeClr val="dk2"/>
+                </a:solidFill>
+              </a:rPr>
+              <a:t>FAIRness</a:t>
+            </a:r>
+            <a:r>
+              <a:rPr lang="en" sz="1800" dirty="0">
+                <a:solidFill>
+                  <a:schemeClr val="dk2"/>
+                </a:solidFill>
+              </a:rPr>
+              <a:t> (Findable, Accessible, Interoperable, Reusable) of digital resources.</a:t>
+            </a:r>
+            <a:endParaRPr sz="1800" dirty="0">
               <a:solidFill>
                 <a:schemeClr val="dk2"/>
               </a:solidFill>
@@ -22886,14 +22990,14 @@
               <a:buChar char="●"/>
             </a:pPr>
             <a:r>
-              <a:rPr lang="en" sz="1800" b="1">
+              <a:rPr lang="en" sz="1800" b="1" dirty="0">
                 <a:solidFill>
                   <a:schemeClr val="dk2"/>
                 </a:solidFill>
               </a:rPr>
               <a:t>Functionality: </a:t>
             </a:r>
-            <a:endParaRPr sz="1800" b="1">
+            <a:endParaRPr sz="1800" b="1" dirty="0">
               <a:solidFill>
                 <a:schemeClr val="dk2"/>
               </a:solidFill>
@@ -22917,14 +23021,14 @@
               <a:buChar char="○"/>
             </a:pPr>
             <a:r>
-              <a:rPr lang="en" sz="1800">
+              <a:rPr lang="en" sz="1800" dirty="0">
                 <a:solidFill>
                   <a:schemeClr val="dk2"/>
                 </a:solidFill>
               </a:rPr>
               <a:t>Assesses a resource based on FAIR metrics associated with each FAIR principle.</a:t>
             </a:r>
-            <a:endParaRPr sz="1800">
+            <a:endParaRPr sz="1800" dirty="0">
               <a:solidFill>
                 <a:schemeClr val="dk2"/>
               </a:solidFill>
@@ -22948,7 +23052,7 @@
               <a:buChar char="●"/>
             </a:pPr>
             <a:r>
-              <a:rPr lang="en" sz="1800" b="1">
+              <a:rPr lang="en" sz="1800" b="1" dirty="0">
                 <a:solidFill>
                   <a:schemeClr val="dk2"/>
                 </a:solidFill>
@@ -22956,14 +23060,14 @@
               <a:t>Benefits:</a:t>
             </a:r>
             <a:r>
-              <a:rPr lang="en" sz="1800">
+              <a:rPr lang="en" sz="1800" dirty="0">
                 <a:solidFill>
                   <a:schemeClr val="dk2"/>
                 </a:solidFill>
               </a:rPr>
               <a:t> </a:t>
             </a:r>
-            <a:endParaRPr sz="1800">
+            <a:endParaRPr sz="1800" dirty="0">
               <a:solidFill>
                 <a:schemeClr val="dk2"/>
               </a:solidFill>
@@ -22987,14 +23091,14 @@
               <a:buChar char="○"/>
             </a:pPr>
             <a:r>
-              <a:rPr lang="en" sz="1800">
+              <a:rPr lang="en" sz="1800" dirty="0">
                 <a:solidFill>
                   <a:schemeClr val="dk2"/>
                 </a:solidFill>
               </a:rPr>
               <a:t>Researchers and data providers can utilize the FAIR Evaluator to identify areas for improvement in making their data more findable, accessible, interoperable, and reusable.</a:t>
             </a:r>
-            <a:endParaRPr sz="1800">
+            <a:endParaRPr sz="1800" dirty="0">
               <a:solidFill>
                 <a:schemeClr val="dk2"/>
               </a:solidFill>
@@ -23018,7 +23122,7 @@
               <a:buChar char="●"/>
             </a:pPr>
             <a:r>
-              <a:rPr lang="en" sz="1800">
+              <a:rPr lang="en" sz="1800" dirty="0">
                 <a:solidFill>
                   <a:schemeClr val="dk2"/>
                 </a:solidFill>
@@ -23026,7 +23130,7 @@
               <a:t>Available at </a:t>
             </a:r>
             <a:r>
-              <a:rPr lang="en" sz="1800" u="sng">
+              <a:rPr lang="en" sz="1800" u="sng" dirty="0">
                 <a:solidFill>
                   <a:schemeClr val="accent5"/>
                 </a:solidFill>
@@ -23040,7 +23144,7 @@
               </a:rPr>
               <a:t>https://fairsharing.github.io/FAIR-Evaluator-FrontEnd/</a:t>
             </a:r>
-            <a:endParaRPr sz="1800">
+            <a:endParaRPr sz="1800" dirty="0">
               <a:solidFill>
                 <a:schemeClr val="dk2"/>
               </a:solidFill>
@@ -23059,7 +23163,7 @@
               </a:spcAft>
               <a:buNone/>
             </a:pPr>
-            <a:endParaRPr sz="1800">
+            <a:endParaRPr sz="1800" dirty="0">
               <a:solidFill>
                 <a:schemeClr val="dk2"/>
               </a:solidFill>
@@ -23078,7 +23182,7 @@
               </a:spcAft>
               <a:buNone/>
             </a:pPr>
-            <a:endParaRPr sz="1800">
+            <a:endParaRPr sz="1800" dirty="0">
               <a:solidFill>
                 <a:schemeClr val="dk2"/>
               </a:solidFill>
@@ -23097,7 +23201,7 @@
               </a:spcAft>
               <a:buNone/>
             </a:pPr>
-            <a:endParaRPr sz="1800">
+            <a:endParaRPr sz="1800" dirty="0">
               <a:solidFill>
                 <a:schemeClr val="dk2"/>
               </a:solidFill>
@@ -23116,7 +23220,7 @@
               </a:spcAft>
               <a:buNone/>
             </a:pPr>
-            <a:endParaRPr sz="1800">
+            <a:endParaRPr sz="1800" dirty="0">
               <a:solidFill>
                 <a:schemeClr val="dk2"/>
               </a:solidFill>
@@ -23135,7 +23239,7 @@
               </a:spcAft>
               <a:buNone/>
             </a:pPr>
-            <a:endParaRPr sz="1300">
+            <a:endParaRPr sz="1300" dirty="0">
               <a:solidFill>
                 <a:schemeClr val="dk2"/>
               </a:solidFill>
@@ -23853,7 +23957,7 @@
         <p:spPr>
           <a:xfrm>
             <a:off x="223350" y="1205237"/>
-            <a:ext cx="8697300" cy="467790"/>
+            <a:ext cx="8697300" cy="2733026"/>
           </a:xfrm>
           <a:prstGeom prst="rect">
             <a:avLst/>
@@ -23868,6 +23972,285 @@
             <a:spAutoFit/>
           </a:bodyPr>
           <a:lstStyle/>
+          <a:p>
+            <a:pPr marL="457200" marR="0" lvl="0" indent="-330200" algn="l" rtl="0">
+              <a:lnSpc>
+                <a:spcPct val="115000"/>
+              </a:lnSpc>
+              <a:spcBef>
+                <a:spcPts val="0"/>
+              </a:spcBef>
+              <a:spcAft>
+                <a:spcPts val="0"/>
+              </a:spcAft>
+              <a:buClr>
+                <a:srgbClr val="000000"/>
+              </a:buClr>
+              <a:buSzPts val="1600"/>
+              <a:buFont typeface="Arial"/>
+              <a:buChar char="●"/>
+            </a:pPr>
+            <a:r>
+              <a:rPr lang="en-US" sz="1600" b="0" i="0" u="none" strike="noStrike" cap="none" dirty="0">
+                <a:solidFill>
+                  <a:srgbClr val="000000"/>
+                </a:solidFill>
+                <a:latin typeface="Arial"/>
+                <a:ea typeface="Arial"/>
+                <a:cs typeface="Arial"/>
+                <a:sym typeface="Arial"/>
+              </a:rPr>
+              <a:t>Wilkinson, M., Dumontier, M., </a:t>
+            </a:r>
+            <a:r>
+              <a:rPr lang="en-US" sz="1600" b="0" i="0" u="none" strike="noStrike" cap="none" dirty="0" err="1">
+                <a:solidFill>
+                  <a:srgbClr val="000000"/>
+                </a:solidFill>
+                <a:latin typeface="Arial"/>
+                <a:ea typeface="Arial"/>
+                <a:cs typeface="Arial"/>
+                <a:sym typeface="Arial"/>
+              </a:rPr>
+              <a:t>Aalbersberg</a:t>
+            </a:r>
+            <a:r>
+              <a:rPr lang="en-US" sz="1600" b="0" i="0" u="none" strike="noStrike" cap="none" dirty="0">
+                <a:solidFill>
+                  <a:srgbClr val="000000"/>
+                </a:solidFill>
+                <a:latin typeface="Arial"/>
+                <a:ea typeface="Arial"/>
+                <a:cs typeface="Arial"/>
+                <a:sym typeface="Arial"/>
+              </a:rPr>
+              <a:t>, I. et al. The FAIR Guiding Principles for scientific data management and stewardship. Sci Data 3, 160018 (2016). </a:t>
+            </a:r>
+            <a:r>
+              <a:rPr lang="en-US" sz="1600" b="0" i="0" u="none" strike="noStrike" cap="none" dirty="0">
+                <a:solidFill>
+                  <a:srgbClr val="000000"/>
+                </a:solidFill>
+                <a:latin typeface="Arial"/>
+                <a:ea typeface="Arial"/>
+                <a:cs typeface="Arial"/>
+                <a:sym typeface="Arial"/>
+                <a:hlinkClick r:id="rId3"/>
+              </a:rPr>
+              <a:t>https://doi.org/10.1038/sdata.2016.18</a:t>
+            </a:r>
+            <a:endParaRPr lang="en-US" sz="1600" b="0" i="0" u="none" strike="noStrike" cap="none" dirty="0">
+              <a:solidFill>
+                <a:srgbClr val="000000"/>
+              </a:solidFill>
+              <a:latin typeface="Arial"/>
+              <a:ea typeface="Arial"/>
+              <a:cs typeface="Arial"/>
+              <a:sym typeface="Arial"/>
+            </a:endParaRPr>
+          </a:p>
+          <a:p>
+            <a:pPr marL="457200" marR="0" lvl="0" indent="-330200" algn="l" rtl="0">
+              <a:lnSpc>
+                <a:spcPct val="115000"/>
+              </a:lnSpc>
+              <a:spcBef>
+                <a:spcPts val="0"/>
+              </a:spcBef>
+              <a:spcAft>
+                <a:spcPts val="0"/>
+              </a:spcAft>
+              <a:buClr>
+                <a:srgbClr val="000000"/>
+              </a:buClr>
+              <a:buSzPts val="1600"/>
+              <a:buFont typeface="Arial"/>
+              <a:buChar char="●"/>
+            </a:pPr>
+            <a:r>
+              <a:rPr lang="en-US" sz="1600" b="0" i="0" u="none" strike="noStrike" cap="none" dirty="0">
+                <a:solidFill>
+                  <a:srgbClr val="000000"/>
+                </a:solidFill>
+                <a:latin typeface="Arial"/>
+                <a:ea typeface="Arial"/>
+                <a:cs typeface="Arial"/>
+                <a:sym typeface="Arial"/>
+              </a:rPr>
+              <a:t>GO FAIR initiative: Make your data &amp; services FAIR. </a:t>
+            </a:r>
+            <a:r>
+              <a:rPr lang="en-US" sz="1600" b="0" i="0" u="none" strike="noStrike" cap="none" dirty="0">
+                <a:solidFill>
+                  <a:srgbClr val="000000"/>
+                </a:solidFill>
+                <a:latin typeface="Arial"/>
+                <a:ea typeface="Arial"/>
+                <a:cs typeface="Arial"/>
+                <a:sym typeface="Arial"/>
+                <a:hlinkClick r:id="rId4"/>
+              </a:rPr>
+              <a:t>https://www.go-fair.org/</a:t>
+            </a:r>
+            <a:endParaRPr lang="en-US" sz="1600" b="0" i="0" u="none" strike="noStrike" cap="none" dirty="0">
+              <a:solidFill>
+                <a:srgbClr val="000000"/>
+              </a:solidFill>
+              <a:latin typeface="Arial"/>
+              <a:ea typeface="Arial"/>
+              <a:cs typeface="Arial"/>
+              <a:sym typeface="Arial"/>
+            </a:endParaRPr>
+          </a:p>
+          <a:p>
+            <a:pPr marL="457200" marR="0" lvl="0" indent="-330200" algn="l" rtl="0">
+              <a:lnSpc>
+                <a:spcPct val="115000"/>
+              </a:lnSpc>
+              <a:spcBef>
+                <a:spcPts val="0"/>
+              </a:spcBef>
+              <a:spcAft>
+                <a:spcPts val="0"/>
+              </a:spcAft>
+              <a:buClr>
+                <a:srgbClr val="000000"/>
+              </a:buClr>
+              <a:buSzPts val="1600"/>
+              <a:buFont typeface="Arial"/>
+              <a:buChar char="●"/>
+            </a:pPr>
+            <a:r>
+              <a:rPr lang="en-US" sz="1600" b="0" i="0" u="none" strike="noStrike" cap="none" dirty="0">
+                <a:solidFill>
+                  <a:srgbClr val="000000"/>
+                </a:solidFill>
+                <a:latin typeface="Arial"/>
+                <a:ea typeface="Arial"/>
+                <a:cs typeface="Arial"/>
+                <a:sym typeface="Arial"/>
+              </a:rPr>
+              <a:t>Wilkinson, M., Sansone, SA., Schultes, E. et al. A design framework and exemplar metrics for </a:t>
+            </a:r>
+            <a:r>
+              <a:rPr lang="en-US" sz="1600" b="0" i="0" u="none" strike="noStrike" cap="none" dirty="0" err="1">
+                <a:solidFill>
+                  <a:srgbClr val="000000"/>
+                </a:solidFill>
+                <a:latin typeface="Arial"/>
+                <a:ea typeface="Arial"/>
+                <a:cs typeface="Arial"/>
+                <a:sym typeface="Arial"/>
+              </a:rPr>
+              <a:t>FAIRness</a:t>
+            </a:r>
+            <a:r>
+              <a:rPr lang="en-US" sz="1600" b="0" i="0" u="none" strike="noStrike" cap="none" dirty="0">
+                <a:solidFill>
+                  <a:srgbClr val="000000"/>
+                </a:solidFill>
+                <a:latin typeface="Arial"/>
+                <a:ea typeface="Arial"/>
+                <a:cs typeface="Arial"/>
+                <a:sym typeface="Arial"/>
+              </a:rPr>
+              <a:t>. Sci Data 5, 180118 (2018). </a:t>
+            </a:r>
+            <a:r>
+              <a:rPr lang="en-US" sz="1600" b="0" i="0" u="none" strike="noStrike" cap="none" dirty="0">
+                <a:solidFill>
+                  <a:srgbClr val="000000"/>
+                </a:solidFill>
+                <a:latin typeface="Arial"/>
+                <a:ea typeface="Arial"/>
+                <a:cs typeface="Arial"/>
+                <a:sym typeface="Arial"/>
+                <a:hlinkClick r:id="rId5"/>
+              </a:rPr>
+              <a:t>https://doi.org/10.1038/sdata.2018.118</a:t>
+            </a:r>
+            <a:endParaRPr lang="en-US" sz="1600" b="0" i="0" u="none" strike="noStrike" cap="none" dirty="0">
+              <a:solidFill>
+                <a:srgbClr val="000000"/>
+              </a:solidFill>
+              <a:latin typeface="Arial"/>
+              <a:ea typeface="Arial"/>
+              <a:cs typeface="Arial"/>
+              <a:sym typeface="Arial"/>
+            </a:endParaRPr>
+          </a:p>
+          <a:p>
+            <a:pPr marL="457200" marR="0" lvl="0" indent="-330200" algn="l" rtl="0">
+              <a:lnSpc>
+                <a:spcPct val="115000"/>
+              </a:lnSpc>
+              <a:spcBef>
+                <a:spcPts val="0"/>
+              </a:spcBef>
+              <a:spcAft>
+                <a:spcPts val="0"/>
+              </a:spcAft>
+              <a:buClr>
+                <a:srgbClr val="000000"/>
+              </a:buClr>
+              <a:buSzPts val="1600"/>
+              <a:buFont typeface="Arial"/>
+              <a:buChar char="●"/>
+            </a:pPr>
+            <a:r>
+              <a:rPr lang="en-US" sz="1600" dirty="0"/>
+              <a:t>FAIR </a:t>
+            </a:r>
+            <a:r>
+              <a:rPr lang="en-US" sz="1600" dirty="0" err="1"/>
+              <a:t>Evalutaion</a:t>
+            </a:r>
+            <a:r>
+              <a:rPr lang="en-US" sz="1600" dirty="0"/>
+              <a:t> Services. </a:t>
+            </a:r>
+            <a:r>
+              <a:rPr lang="en-US" sz="1600" dirty="0">
+                <a:hlinkClick r:id="rId6"/>
+              </a:rPr>
+              <a:t>https://fairsharing.github.io/FAIR-Evaluator-FrontEnd</a:t>
+            </a:r>
+            <a:r>
+              <a:rPr lang="en-US" sz="1600">
+                <a:hlinkClick r:id="rId6"/>
+              </a:rPr>
+              <a:t>/#!/</a:t>
+            </a:r>
+            <a:endParaRPr lang="en-US" sz="1600" dirty="0"/>
+          </a:p>
+          <a:p>
+            <a:pPr marL="457200" marR="0" lvl="0" indent="-330200" algn="l" rtl="0">
+              <a:lnSpc>
+                <a:spcPct val="115000"/>
+              </a:lnSpc>
+              <a:spcBef>
+                <a:spcPts val="0"/>
+              </a:spcBef>
+              <a:spcAft>
+                <a:spcPts val="0"/>
+              </a:spcAft>
+              <a:buClr>
+                <a:srgbClr val="000000"/>
+              </a:buClr>
+              <a:buSzPts val="1600"/>
+              <a:buFont typeface="Arial"/>
+              <a:buChar char="●"/>
+            </a:pPr>
+            <a:endParaRPr lang="en-US" sz="1600" b="0" i="0" u="none" strike="noStrike" cap="none" dirty="0">
+              <a:solidFill>
+                <a:srgbClr val="000000"/>
+              </a:solidFill>
+              <a:latin typeface="Arial"/>
+              <a:ea typeface="Arial"/>
+              <a:cs typeface="Arial"/>
+              <a:sym typeface="Arial"/>
+            </a:endParaRPr>
+          </a:p>
           <a:p>
             <a:pPr marL="457200" marR="0" lvl="0" indent="-330200" algn="l" rtl="0">
               <a:lnSpc>
@@ -24222,7 +24605,7 @@
           <p:nvPr/>
         </p:nvPicPr>
         <p:blipFill rotWithShape="1">
-          <a:blip r:embed="rId3">
+          <a:blip r:embed="rId7">
             <a:alphaModFix/>
           </a:blip>
           <a:srcRect/>

</xml_diff>